<commit_message>
Added Shelley's Final Changes
</commit_message>
<xml_diff>
--- a/Day02-IntroHPC/data_transfer_tutorial_v2.pptx
+++ b/Day02-IntroHPC/data_transfer_tutorial_v2.pptx
@@ -334,7 +334,7 @@
           <a:p>
             <a:fld id="{3570D28E-59C0-5D4A-B5B2-EDF6C83E12E5}" type="datetimeFigureOut">
               <a:rPr lang="en-US" smtClean="0"/>
-              <a:t>7/25/14</a:t>
+              <a:t>7/28/14</a:t>
             </a:fld>
             <a:endParaRPr lang="en-US"/>
           </a:p>
@@ -519,7 +519,7 @@
           <a:p>
             <a:fld id="{3570D28E-59C0-5D4A-B5B2-EDF6C83E12E5}" type="datetimeFigureOut">
               <a:rPr lang="en-US" smtClean="0"/>
-              <a:t>7/25/14</a:t>
+              <a:t>7/28/14</a:t>
             </a:fld>
             <a:endParaRPr lang="en-US"/>
           </a:p>
@@ -714,7 +714,7 @@
           <a:p>
             <a:fld id="{3570D28E-59C0-5D4A-B5B2-EDF6C83E12E5}" type="datetimeFigureOut">
               <a:rPr lang="en-US" smtClean="0"/>
-              <a:t>7/25/14</a:t>
+              <a:t>7/28/14</a:t>
             </a:fld>
             <a:endParaRPr lang="en-US"/>
           </a:p>
@@ -899,7 +899,7 @@
           <a:p>
             <a:fld id="{3570D28E-59C0-5D4A-B5B2-EDF6C83E12E5}" type="datetimeFigureOut">
               <a:rPr lang="en-US" smtClean="0"/>
-              <a:t>7/25/14</a:t>
+              <a:t>7/28/14</a:t>
             </a:fld>
             <a:endParaRPr lang="en-US"/>
           </a:p>
@@ -1164,7 +1164,7 @@
           <a:p>
             <a:fld id="{3570D28E-59C0-5D4A-B5B2-EDF6C83E12E5}" type="datetimeFigureOut">
               <a:rPr lang="en-US" smtClean="0"/>
-              <a:t>7/25/14</a:t>
+              <a:t>7/28/14</a:t>
             </a:fld>
             <a:endParaRPr lang="en-US"/>
           </a:p>
@@ -1467,7 +1467,7 @@
           <a:p>
             <a:fld id="{3570D28E-59C0-5D4A-B5B2-EDF6C83E12E5}" type="datetimeFigureOut">
               <a:rPr lang="en-US" smtClean="0"/>
-              <a:t>7/25/14</a:t>
+              <a:t>7/28/14</a:t>
             </a:fld>
             <a:endParaRPr lang="en-US"/>
           </a:p>
@@ -1916,7 +1916,7 @@
           <a:p>
             <a:fld id="{3570D28E-59C0-5D4A-B5B2-EDF6C83E12E5}" type="datetimeFigureOut">
               <a:rPr lang="en-US" smtClean="0"/>
-              <a:t>7/25/14</a:t>
+              <a:t>7/28/14</a:t>
             </a:fld>
             <a:endParaRPr lang="en-US"/>
           </a:p>
@@ -2049,7 +2049,7 @@
           <a:p>
             <a:fld id="{3570D28E-59C0-5D4A-B5B2-EDF6C83E12E5}" type="datetimeFigureOut">
               <a:rPr lang="en-US" smtClean="0"/>
-              <a:t>7/25/14</a:t>
+              <a:t>7/28/14</a:t>
             </a:fld>
             <a:endParaRPr lang="en-US"/>
           </a:p>
@@ -2159,7 +2159,7 @@
           <a:p>
             <a:fld id="{3570D28E-59C0-5D4A-B5B2-EDF6C83E12E5}" type="datetimeFigureOut">
               <a:rPr lang="en-US" smtClean="0"/>
-              <a:t>7/25/14</a:t>
+              <a:t>7/28/14</a:t>
             </a:fld>
             <a:endParaRPr lang="en-US"/>
           </a:p>
@@ -2368,7 +2368,7 @@
           <a:p>
             <a:fld id="{3570D28E-59C0-5D4A-B5B2-EDF6C83E12E5}" type="datetimeFigureOut">
               <a:rPr lang="en-US" smtClean="0"/>
-              <a:t>7/25/14</a:t>
+              <a:t>7/28/14</a:t>
             </a:fld>
             <a:endParaRPr lang="en-US"/>
           </a:p>
@@ -2706,7 +2706,7 @@
           <a:p>
             <a:fld id="{3570D28E-59C0-5D4A-B5B2-EDF6C83E12E5}" type="datetimeFigureOut">
               <a:rPr lang="en-US" smtClean="0"/>
-              <a:t>7/25/14</a:t>
+              <a:t>7/28/14</a:t>
             </a:fld>
             <a:endParaRPr lang="en-US"/>
           </a:p>
@@ -3060,7 +3060,7 @@
           <a:p>
             <a:fld id="{3570D28E-59C0-5D4A-B5B2-EDF6C83E12E5}" type="datetimeFigureOut">
               <a:rPr lang="en-US" smtClean="0"/>
-              <a:t>7/25/14</a:t>
+              <a:t>7/28/14</a:t>
             </a:fld>
             <a:endParaRPr lang="en-US"/>
           </a:p>
@@ -4722,25 +4722,16 @@
               <a:rPr lang="en-US" dirty="0" smtClean="0">
                 <a:cs typeface="Helvetica Neue"/>
               </a:rPr>
-              <a:t>Can download from multiple locations at same </a:t>
-            </a:r>
+              <a:t>Can download from multiple locations at same time</a:t>
+            </a:r>
+          </a:p>
+          <a:p>
             <a:r>
               <a:rPr lang="en-US" dirty="0" smtClean="0">
                 <a:cs typeface="Helvetica Neue"/>
               </a:rPr>
-              <a:t>time</a:t>
-            </a:r>
-          </a:p>
-          <a:p>
-            <a:r>
-              <a:rPr lang="en-US" dirty="0" smtClean="0">
-                <a:cs typeface="Helvetica Neue"/>
-              </a:rPr>
               <a:t>Science use:  disseminate academic publications</a:t>
             </a:r>
-            <a:endParaRPr lang="en-US" dirty="0" smtClean="0">
-              <a:cs typeface="Helvetica Neue"/>
-            </a:endParaRPr>
           </a:p>
         </p:txBody>
       </p:sp>
@@ -5632,6 +5623,13 @@
   <p:clrMapOvr>
     <a:masterClrMapping/>
   </p:clrMapOvr>
+  <p:timing>
+    <p:tnLst>
+      <p:par>
+        <p:cTn xmlns:p14="http://schemas.microsoft.com/office/powerpoint/2010/main" id="1" dur="indefinite" restart="never" nodeType="tmRoot"/>
+      </p:par>
+    </p:tnLst>
+  </p:timing>
 </p:sld>
 </file>
 
@@ -7988,13 +7986,7 @@
               <a:rPr lang="en-US" dirty="0" smtClean="0">
                 <a:hlinkClick r:id="rId2"/>
               </a:rPr>
-              <a:t>Shelley.Knuth</a:t>
-            </a:r>
-            <a:r>
-              <a:rPr lang="en-US" dirty="0" smtClean="0">
-                <a:hlinkClick r:id="rId2"/>
-              </a:rPr>
-              <a:t>@colorado.edu</a:t>
+              <a:t>Shelley.Knuth@colorado.edu</a:t>
             </a:r>
             <a:endParaRPr lang="en-US" dirty="0" smtClean="0"/>
           </a:p>
@@ -8062,6 +8054,13 @@
   <p:clrMapOvr>
     <a:masterClrMapping/>
   </p:clrMapOvr>
+  <p:timing>
+    <p:tnLst>
+      <p:par>
+        <p:cTn xmlns:p14="http://schemas.microsoft.com/office/powerpoint/2010/main" id="1" dur="indefinite" restart="never" nodeType="tmRoot"/>
+      </p:par>
+    </p:tnLst>
+  </p:timing>
 </p:sld>
 </file>
 
@@ -8916,12 +8915,6 @@
             <a:r>
               <a:rPr lang="en-US" dirty="0" smtClean="0"/>
               <a:t>4G Cell phone:  12 MB/s</a:t>
-            </a:r>
-          </a:p>
-          <a:p>
-            <a:r>
-              <a:rPr lang="en-US" dirty="0" smtClean="0"/>
-              <a:t>Science DMZ:  100 GB/s</a:t>
             </a:r>
           </a:p>
           <a:p>

</xml_diff>